<commit_message>
Added .png version for visualization
</commit_message>
<xml_diff>
--- a/presentation/progress.pptx
+++ b/presentation/progress.pptx
@@ -279,7 +279,7 @@
           <a:p>
             <a:fld id="{5280FAC3-142A-EC45-AF3E-D0BD90701C40}" type="datetimeFigureOut">
               <a:rPr lang="en-US" smtClean="0"/>
-              <a:t>11/3/19</a:t>
+              <a:t>11/6/19</a:t>
             </a:fld>
             <a:endParaRPr lang="en-US"/>
           </a:p>
@@ -693,7 +693,7 @@
           <a:p>
             <a:fld id="{ED1678BD-FA80-134D-998F-59CE0CA5724C}" type="datetimeFigureOut">
               <a:rPr lang="en-US" smtClean="0"/>
-              <a:t>11/3/19</a:t>
+              <a:t>11/6/19</a:t>
             </a:fld>
             <a:endParaRPr lang="en-US"/>
           </a:p>
@@ -891,7 +891,7 @@
           <a:p>
             <a:fld id="{ED1678BD-FA80-134D-998F-59CE0CA5724C}" type="datetimeFigureOut">
               <a:rPr lang="en-US" smtClean="0"/>
-              <a:t>11/3/19</a:t>
+              <a:t>11/6/19</a:t>
             </a:fld>
             <a:endParaRPr lang="en-US"/>
           </a:p>
@@ -1099,7 +1099,7 @@
           <a:p>
             <a:fld id="{ED1678BD-FA80-134D-998F-59CE0CA5724C}" type="datetimeFigureOut">
               <a:rPr lang="en-US" smtClean="0"/>
-              <a:t>11/3/19</a:t>
+              <a:t>11/6/19</a:t>
             </a:fld>
             <a:endParaRPr lang="en-US"/>
           </a:p>
@@ -1297,7 +1297,7 @@
           <a:p>
             <a:fld id="{ED1678BD-FA80-134D-998F-59CE0CA5724C}" type="datetimeFigureOut">
               <a:rPr lang="en-US" smtClean="0"/>
-              <a:t>11/3/19</a:t>
+              <a:t>11/6/19</a:t>
             </a:fld>
             <a:endParaRPr lang="en-US"/>
           </a:p>
@@ -1572,7 +1572,7 @@
           <a:p>
             <a:fld id="{ED1678BD-FA80-134D-998F-59CE0CA5724C}" type="datetimeFigureOut">
               <a:rPr lang="en-US" smtClean="0"/>
-              <a:t>11/3/19</a:t>
+              <a:t>11/6/19</a:t>
             </a:fld>
             <a:endParaRPr lang="en-US"/>
           </a:p>
@@ -1837,7 +1837,7 @@
           <a:p>
             <a:fld id="{ED1678BD-FA80-134D-998F-59CE0CA5724C}" type="datetimeFigureOut">
               <a:rPr lang="en-US" smtClean="0"/>
-              <a:t>11/3/19</a:t>
+              <a:t>11/6/19</a:t>
             </a:fld>
             <a:endParaRPr lang="en-US"/>
           </a:p>
@@ -2249,7 +2249,7 @@
           <a:p>
             <a:fld id="{ED1678BD-FA80-134D-998F-59CE0CA5724C}" type="datetimeFigureOut">
               <a:rPr lang="en-US" smtClean="0"/>
-              <a:t>11/3/19</a:t>
+              <a:t>11/6/19</a:t>
             </a:fld>
             <a:endParaRPr lang="en-US"/>
           </a:p>
@@ -2390,7 +2390,7 @@
           <a:p>
             <a:fld id="{ED1678BD-FA80-134D-998F-59CE0CA5724C}" type="datetimeFigureOut">
               <a:rPr lang="en-US" smtClean="0"/>
-              <a:t>11/3/19</a:t>
+              <a:t>11/6/19</a:t>
             </a:fld>
             <a:endParaRPr lang="en-US"/>
           </a:p>
@@ -2503,7 +2503,7 @@
           <a:p>
             <a:fld id="{ED1678BD-FA80-134D-998F-59CE0CA5724C}" type="datetimeFigureOut">
               <a:rPr lang="en-US" smtClean="0"/>
-              <a:t>11/3/19</a:t>
+              <a:t>11/6/19</a:t>
             </a:fld>
             <a:endParaRPr lang="en-US"/>
           </a:p>
@@ -2814,7 +2814,7 @@
           <a:p>
             <a:fld id="{ED1678BD-FA80-134D-998F-59CE0CA5724C}" type="datetimeFigureOut">
               <a:rPr lang="en-US" smtClean="0"/>
-              <a:t>11/3/19</a:t>
+              <a:t>11/6/19</a:t>
             </a:fld>
             <a:endParaRPr lang="en-US"/>
           </a:p>
@@ -3102,7 +3102,7 @@
           <a:p>
             <a:fld id="{ED1678BD-FA80-134D-998F-59CE0CA5724C}" type="datetimeFigureOut">
               <a:rPr lang="en-US" smtClean="0"/>
-              <a:t>11/3/19</a:t>
+              <a:t>11/6/19</a:t>
             </a:fld>
             <a:endParaRPr lang="en-US"/>
           </a:p>
@@ -3343,7 +3343,7 @@
           <a:p>
             <a:fld id="{ED1678BD-FA80-134D-998F-59CE0CA5724C}" type="datetimeFigureOut">
               <a:rPr lang="en-US" smtClean="0"/>
-              <a:t>11/3/19</a:t>
+              <a:t>11/6/19</a:t>
             </a:fld>
             <a:endParaRPr lang="en-US"/>
           </a:p>
@@ -4061,7 +4061,7 @@
             </a:pPr>
             <a:r>
               <a:rPr lang="en-US" dirty="0"/>
-              <a:t>Vertices: 4,611,170</a:t>
+              <a:t>|V|: 4,611,170</a:t>
             </a:r>
           </a:p>
           <a:p>
@@ -4069,8 +4069,12 @@
               <a:buNone/>
             </a:pPr>
             <a:r>
-              <a:rPr lang="en-US" dirty="0"/>
-              <a:t>Edges: 8,514,389</a:t>
+              <a:rPr lang="en-US"/>
+              <a:t>|E|: </a:t>
+            </a:r>
+            <a:r>
+              <a:rPr lang="en-US" dirty="0"/>
+              <a:t>8,514,389</a:t>
             </a:r>
           </a:p>
           <a:p>
@@ -4079,13 +4083,8 @@
             </a:pPr>
             <a:r>
               <a:rPr lang="en-US" dirty="0"/>
-              <a:t>Connected components</a:t>
-            </a:r>
-            <a:r>
-              <a:rPr lang="en-US"/>
-              <a:t>: 1,244</a:t>
-            </a:r>
-            <a:endParaRPr lang="en-US" dirty="0"/>
+              <a:t>Connected components: 1,244</a:t>
+            </a:r>
           </a:p>
         </p:txBody>
       </p:sp>
@@ -6650,7 +6649,7 @@
             </a:pPr>
             <a:r>
               <a:rPr lang="en-US" dirty="0"/>
-              <a:t>13091 user profiles (~49.6% of accounts less than original dataset, rest has been deleted or is a locked account).</a:t>
+              <a:t>13,091 user profiles (~49.6% of accounts less than original dataset, rest has been deleted or is a locked account).</a:t>
             </a:r>
           </a:p>
           <a:p>
@@ -6665,7 +6664,7 @@
             </a:pPr>
             <a:r>
               <a:rPr lang="en-US" dirty="0"/>
-              <a:t>6082 human accounts.</a:t>
+              <a:t>6,082 human accounts.</a:t>
             </a:r>
           </a:p>
           <a:p>
@@ -6674,7 +6673,7 @@
             </a:pPr>
             <a:r>
               <a:rPr lang="en-US" dirty="0"/>
-              <a:t>7009 bot accounts.</a:t>
+              <a:t>7,009 bot accounts.</a:t>
             </a:r>
           </a:p>
           <a:p>

</xml_diff>